<commit_message>
update presentation, status codes
</commit_message>
<xml_diff>
--- a/BEcome.AIESEC.Tech.Levi9.March.2016.pptx
+++ b/BEcome.AIESEC.Tech.Levi9.March.2016.pptx
@@ -3645,10 +3645,10 @@
                 <a:ea typeface="+mn-ea"/>
                 <a:cs typeface="+mn-cs"/>
               </a:rPr>
-              <a:t>REST expose information as resources through URIs (uniform resource identifiers) and executes actions using </a:t>
-            </a:r>
-            <a:r>
-              <a:rPr lang="en-US" sz="1200" b="0" i="0" kern="1200" baseline="0" smtClean="0">
+              <a:t>REST expose information as </a:t>
+            </a:r>
+            <a:r>
+              <a:rPr lang="en-US" sz="1200" b="0" i="0" kern="1200" baseline="0" dirty="0" smtClean="0">
                 <a:solidFill>
                   <a:schemeClr val="tx1"/>
                 </a:solidFill>
@@ -3657,9 +3657,358 @@
                 <a:ea typeface="+mn-ea"/>
                 <a:cs typeface="+mn-cs"/>
               </a:rPr>
-              <a:t>HTTP verbs.</a:t>
-            </a:r>
-            <a:endParaRPr lang="ro-RO" b="0" dirty="0" smtClean="0"/>
+              <a:t>resources </a:t>
+            </a:r>
+            <a:r>
+              <a:rPr lang="en-US" sz="1200" b="0" i="0" kern="1200" baseline="0" dirty="0" smtClean="0">
+                <a:solidFill>
+                  <a:schemeClr val="tx1"/>
+                </a:solidFill>
+                <a:effectLst/>
+                <a:latin typeface="+mn-lt"/>
+                <a:ea typeface="+mn-ea"/>
+                <a:cs typeface="+mn-cs"/>
+              </a:rPr>
+              <a:t>through URIs (uniform resource identifiers) and executes actions using HTTP verbs</a:t>
+            </a:r>
+            <a:r>
+              <a:rPr lang="en-US" sz="1200" b="0" i="0" kern="1200" baseline="0" dirty="0" smtClean="0">
+                <a:solidFill>
+                  <a:schemeClr val="tx1"/>
+                </a:solidFill>
+                <a:effectLst/>
+                <a:latin typeface="+mn-lt"/>
+                <a:ea typeface="+mn-ea"/>
+                <a:cs typeface="+mn-cs"/>
+              </a:rPr>
+              <a:t>.</a:t>
+            </a:r>
+          </a:p>
+          <a:p>
+            <a:endParaRPr lang="en-US" sz="1200" b="0" i="0" kern="1200" baseline="0" dirty="0" smtClean="0">
+              <a:solidFill>
+                <a:schemeClr val="tx1"/>
+              </a:solidFill>
+              <a:effectLst/>
+              <a:latin typeface="+mn-lt"/>
+              <a:ea typeface="+mn-ea"/>
+              <a:cs typeface="+mn-cs"/>
+            </a:endParaRPr>
+          </a:p>
+          <a:p>
+            <a:pPr marL="0" marR="0" indent="0" algn="l" defTabSz="914400" rtl="0" eaLnBrk="1" fontAlgn="auto" latinLnBrk="0" hangingPunct="1">
+              <a:lnSpc>
+                <a:spcPct val="100000"/>
+              </a:lnSpc>
+              <a:spcBef>
+                <a:spcPts val="0"/>
+              </a:spcBef>
+              <a:spcAft>
+                <a:spcPts val="0"/>
+              </a:spcAft>
+              <a:buClrTx/>
+              <a:buSzTx/>
+              <a:buFontTx/>
+              <a:buNone/>
+              <a:tabLst/>
+              <a:defRPr/>
+            </a:pPr>
+            <a:r>
+              <a:rPr lang="en-US" sz="1200" b="0" i="0" kern="1200" dirty="0" smtClean="0">
+                <a:solidFill>
+                  <a:schemeClr val="tx1"/>
+                </a:solidFill>
+                <a:effectLst/>
+                <a:latin typeface="+mn-lt"/>
+                <a:ea typeface="+mn-ea"/>
+                <a:cs typeface="+mn-cs"/>
+              </a:rPr>
+              <a:t>1xx Informational</a:t>
+            </a:r>
+          </a:p>
+          <a:p>
+            <a:r>
+              <a:rPr lang="en-US" b="0" dirty="0" smtClean="0"/>
+              <a:t>Request received, continuing process.[4]</a:t>
+            </a:r>
+          </a:p>
+          <a:p>
+            <a:endParaRPr lang="en-US" b="0" dirty="0" smtClean="0"/>
+          </a:p>
+          <a:p>
+            <a:pPr marL="0" marR="0" indent="0" algn="l" defTabSz="914400" rtl="0" eaLnBrk="1" fontAlgn="auto" latinLnBrk="0" hangingPunct="1">
+              <a:lnSpc>
+                <a:spcPct val="100000"/>
+              </a:lnSpc>
+              <a:spcBef>
+                <a:spcPts val="0"/>
+              </a:spcBef>
+              <a:spcAft>
+                <a:spcPts val="0"/>
+              </a:spcAft>
+              <a:buClrTx/>
+              <a:buSzTx/>
+              <a:buFontTx/>
+              <a:buNone/>
+              <a:tabLst/>
+              <a:defRPr/>
+            </a:pPr>
+            <a:r>
+              <a:rPr lang="en-US" sz="1200" b="0" i="0" kern="1200" dirty="0" smtClean="0">
+                <a:solidFill>
+                  <a:schemeClr val="tx1"/>
+                </a:solidFill>
+                <a:effectLst/>
+                <a:latin typeface="+mn-lt"/>
+                <a:ea typeface="+mn-ea"/>
+                <a:cs typeface="+mn-cs"/>
+              </a:rPr>
+              <a:t>2xx Success</a:t>
+            </a:r>
+          </a:p>
+          <a:p>
+            <a:r>
+              <a:rPr lang="en-US" b="0" dirty="0" smtClean="0"/>
+              <a:t>This class of status codes indicates the action requested by the client was received, understood, accepted, and processed successfully.[9]</a:t>
+            </a:r>
+          </a:p>
+          <a:p>
+            <a:r>
+              <a:rPr lang="en-US" b="0" dirty="0" smtClean="0"/>
+              <a:t>200 OK</a:t>
+            </a:r>
+          </a:p>
+          <a:p>
+            <a:r>
+              <a:rPr lang="en-US" b="0" dirty="0" smtClean="0"/>
+              <a:t>Standard response for successful HTTP requests. The actual response will depend on the request method used. In a GET request, the response will contain an entity corresponding to the requested resource. In a POST request, the response will contain an entity describing or containing the result of the action.[10]</a:t>
+            </a:r>
+          </a:p>
+          <a:p>
+            <a:r>
+              <a:rPr lang="en-US" b="0" dirty="0" smtClean="0"/>
+              <a:t>201 Created</a:t>
+            </a:r>
+          </a:p>
+          <a:p>
+            <a:r>
+              <a:rPr lang="en-US" b="0" dirty="0" smtClean="0"/>
+              <a:t>The request has been fulfilled, resulting in the creation of a new resource.[11]</a:t>
+            </a:r>
+          </a:p>
+          <a:p>
+            <a:r>
+              <a:rPr lang="en-US" b="0" dirty="0" smtClean="0"/>
+              <a:t>204 No Content</a:t>
+            </a:r>
+          </a:p>
+          <a:p>
+            <a:r>
+              <a:rPr lang="en-US" b="0" dirty="0" smtClean="0"/>
+              <a:t>The server successfully processed the request and is not returning any content.[15]</a:t>
+            </a:r>
+          </a:p>
+          <a:p>
+            <a:endParaRPr lang="en-US" b="0" dirty="0" smtClean="0"/>
+          </a:p>
+          <a:p>
+            <a:r>
+              <a:rPr lang="en-US" b="0" dirty="0" smtClean="0"/>
+              <a:t>3xx Redirection</a:t>
+            </a:r>
+          </a:p>
+          <a:p>
+            <a:endParaRPr lang="en-US" b="0" dirty="0" smtClean="0"/>
+          </a:p>
+          <a:p>
+            <a:pPr marL="0" marR="0" indent="0" algn="l" defTabSz="914400" rtl="0" eaLnBrk="1" fontAlgn="auto" latinLnBrk="0" hangingPunct="1">
+              <a:lnSpc>
+                <a:spcPct val="100000"/>
+              </a:lnSpc>
+              <a:spcBef>
+                <a:spcPts val="0"/>
+              </a:spcBef>
+              <a:spcAft>
+                <a:spcPts val="0"/>
+              </a:spcAft>
+              <a:buClrTx/>
+              <a:buSzTx/>
+              <a:buFontTx/>
+              <a:buNone/>
+              <a:tabLst/>
+              <a:defRPr/>
+            </a:pPr>
+            <a:r>
+              <a:rPr lang="en-US" sz="1200" b="0" i="0" kern="1200" dirty="0" smtClean="0">
+                <a:solidFill>
+                  <a:schemeClr val="tx1"/>
+                </a:solidFill>
+                <a:effectLst/>
+                <a:latin typeface="+mn-lt"/>
+                <a:ea typeface="+mn-ea"/>
+                <a:cs typeface="+mn-cs"/>
+              </a:rPr>
+              <a:t>4xx Client Error</a:t>
+            </a:r>
+          </a:p>
+          <a:p>
+            <a:r>
+              <a:rPr lang="en-US" b="0" dirty="0" smtClean="0"/>
+              <a:t>400 Bad Request</a:t>
+            </a:r>
+          </a:p>
+          <a:p>
+            <a:r>
+              <a:rPr lang="en-US" b="0" dirty="0" smtClean="0"/>
+              <a:t>The server cannot or will not process the request due to an apparent client error (e.g., malformed request syntax, invalid request message framing, or deceptive request routing).[36]</a:t>
+            </a:r>
+          </a:p>
+          <a:p>
+            <a:r>
+              <a:rPr lang="en-US" b="0" dirty="0" smtClean="0"/>
+              <a:t>401 Unauthorized (RFC 7235)</a:t>
+            </a:r>
+          </a:p>
+          <a:p>
+            <a:r>
+              <a:rPr lang="en-US" b="0" dirty="0" smtClean="0"/>
+              <a:t>Similar to 403 Forbidden, but specifically for use when authentication is required and has failed or has not yet been provided. The response must include a WWW-Authenticate header field containing a challenge applicable to the requested resource. See Basic access authentication and Digest access authentication.[37] 401 semantically means "unauthenticated",[38] i.e. the user does not have the necessary credentials.</a:t>
+            </a:r>
+          </a:p>
+          <a:p>
+            <a:r>
+              <a:rPr lang="en-US" b="0" dirty="0" smtClean="0"/>
+              <a:t>Note: Some sites issue HTTP 401 when an IP address is banned from the website (usually the website domain) and that specific address is refused permission to access a website.</a:t>
+            </a:r>
+          </a:p>
+          <a:p>
+            <a:r>
+              <a:rPr lang="en-US" b="0" dirty="0" smtClean="0"/>
+              <a:t>403 Forbidden</a:t>
+            </a:r>
+          </a:p>
+          <a:p>
+            <a:r>
+              <a:rPr lang="en-US" b="0" dirty="0" smtClean="0"/>
+              <a:t>The request was a valid request, but the server is refusing to respond to it. 403 error semantically means "unauthorized", i.e. the user does not have the necessary permissions for the resource.</a:t>
+            </a:r>
+          </a:p>
+          <a:p>
+            <a:r>
+              <a:rPr lang="en-US" b="0" dirty="0" smtClean="0"/>
+              <a:t>404 Not Found</a:t>
+            </a:r>
+          </a:p>
+          <a:p>
+            <a:r>
+              <a:rPr lang="en-US" b="0" dirty="0" smtClean="0"/>
+              <a:t>The requested resource could not be found but may be available again in the future. Subsequent requests by the client are permissible.[40]</a:t>
+            </a:r>
+          </a:p>
+          <a:p>
+            <a:r>
+              <a:rPr lang="en-US" b="0" dirty="0" smtClean="0"/>
+              <a:t>405 Method Not Allowed</a:t>
+            </a:r>
+          </a:p>
+          <a:p>
+            <a:r>
+              <a:rPr lang="en-US" b="0" dirty="0" smtClean="0"/>
+              <a:t>A request method is not supported for the requested resource; for example, a GET request on a form which requires data to be presented via POST, or a PUT request on a read-only resource.</a:t>
+            </a:r>
+          </a:p>
+          <a:p>
+            <a:r>
+              <a:rPr lang="en-US" b="0" dirty="0" smtClean="0"/>
+              <a:t>415 Unsupported Media Type</a:t>
+            </a:r>
+          </a:p>
+          <a:p>
+            <a:r>
+              <a:rPr lang="en-US" b="0" dirty="0" smtClean="0"/>
+              <a:t>The request entity has a media type which the server or resource does not support. For example, the client uploads an image as image/</a:t>
+            </a:r>
+            <a:r>
+              <a:rPr lang="en-US" b="0" dirty="0" err="1" smtClean="0"/>
+              <a:t>svg+xml</a:t>
+            </a:r>
+            <a:r>
+              <a:rPr lang="en-US" b="0" dirty="0" smtClean="0"/>
+              <a:t>, but the server requires that images use a different format.</a:t>
+            </a:r>
+          </a:p>
+          <a:p>
+            <a:endParaRPr lang="en-US" b="0" dirty="0" smtClean="0"/>
+          </a:p>
+          <a:p>
+            <a:r>
+              <a:rPr lang="en-US" b="0" dirty="0" smtClean="0"/>
+              <a:t>429 Too Many Requests (RFC 6585)</a:t>
+            </a:r>
+          </a:p>
+          <a:p>
+            <a:r>
+              <a:rPr lang="en-US" b="0" dirty="0" smtClean="0"/>
+              <a:t>The user has sent too many requests in a given amount of time. Intended for use with rate limiting schemes.[57]</a:t>
+            </a:r>
+          </a:p>
+          <a:p>
+            <a:endParaRPr lang="en-US" b="0" dirty="0" smtClean="0"/>
+          </a:p>
+          <a:p>
+            <a:pPr marL="0" marR="0" indent="0" algn="l" defTabSz="914400" rtl="0" eaLnBrk="1" fontAlgn="auto" latinLnBrk="0" hangingPunct="1">
+              <a:lnSpc>
+                <a:spcPct val="100000"/>
+              </a:lnSpc>
+              <a:spcBef>
+                <a:spcPts val="0"/>
+              </a:spcBef>
+              <a:spcAft>
+                <a:spcPts val="0"/>
+              </a:spcAft>
+              <a:buClrTx/>
+              <a:buSzTx/>
+              <a:buFontTx/>
+              <a:buNone/>
+              <a:tabLst/>
+              <a:defRPr/>
+            </a:pPr>
+            <a:r>
+              <a:rPr lang="en-US" sz="1200" b="0" i="0" kern="1200" dirty="0" smtClean="0">
+                <a:solidFill>
+                  <a:schemeClr val="tx1"/>
+                </a:solidFill>
+                <a:effectLst/>
+                <a:latin typeface="+mn-lt"/>
+                <a:ea typeface="+mn-ea"/>
+                <a:cs typeface="+mn-cs"/>
+              </a:rPr>
+              <a:t>5xx Server Error</a:t>
+            </a:r>
+          </a:p>
+          <a:p>
+            <a:r>
+              <a:rPr lang="en-US" b="0" dirty="0" smtClean="0"/>
+              <a:t>500 Internal Server Error</a:t>
+            </a:r>
+          </a:p>
+          <a:p>
+            <a:r>
+              <a:rPr lang="en-US" b="0" dirty="0" smtClean="0"/>
+              <a:t>A generic error message, given when an unexpected condition was encountered and no more specific message is suitable.[62]</a:t>
+            </a:r>
+          </a:p>
+          <a:p>
+            <a:r>
+              <a:rPr lang="en-US" b="0" dirty="0" smtClean="0"/>
+              <a:t>501 Not Implemented</a:t>
+            </a:r>
+          </a:p>
+          <a:p>
+            <a:r>
+              <a:rPr lang="en-US" b="0" dirty="0" smtClean="0"/>
+              <a:t>The server either does not recognize the request method, or it lacks the ability to fulfill the request. Usually this implies future availability (e.g., a new feature of a web-service API).[63]</a:t>
+            </a:r>
           </a:p>
         </p:txBody>
       </p:sp>
@@ -13671,15 +14020,6 @@
 </file>
 
 <file path=customXml/item1.xml><?xml version="1.0" encoding="utf-8"?>
-<?mso-contentType ?>
-<FormTemplates xmlns="http://schemas.microsoft.com/sharepoint/v3/contenttype/forms">
-  <Display>DocumentLibraryForm</Display>
-  <Edit>DocumentLibraryForm</Edit>
-  <New>DocumentLibraryForm</New>
-</FormTemplates>
-</file>
-
-<file path=customXml/item2.xml><?xml version="1.0" encoding="utf-8"?>
 <p:properties xmlns:p="http://schemas.microsoft.com/office/2006/metadata/properties" xmlns:xsi="http://www.w3.org/2001/XMLSchema-instance" xmlns:pc="http://schemas.microsoft.com/office/infopath/2007/PartnerControls">
   <documentManagement>
     <TemplateUrl xmlns="http://schemas.microsoft.com/sharepoint/v3" xsi:nil="true"/>
@@ -13698,7 +14038,66 @@
 </p:properties>
 </file>
 
+<file path=customXml/item2.xml><?xml version="1.0" encoding="utf-8"?>
+<?mso-contentType ?>
+<FormTemplates xmlns="http://schemas.microsoft.com/sharepoint/v3/contenttype/forms">
+  <Display>DocumentLibraryForm</Display>
+  <Edit>DocumentLibraryForm</Edit>
+  <New>DocumentLibraryForm</New>
+</FormTemplates>
+</file>
+
 <file path=customXml/item3.xml><?xml version="1.0" encoding="utf-8"?>
+<?mso-contentType ?>
+<spe:Receivers xmlns:spe="http://schemas.microsoft.com/sharepoint/events">
+  <Receiver>
+    <Name>Document ID Generator</Name>
+    <Synchronization>Synchronous</Synchronization>
+    <Type>10001</Type>
+    <SequenceNumber>1000</SequenceNumber>
+    <Url/>
+    <Assembly>Microsoft.Office.DocumentManagement, Version=15.0.0.0, Culture=neutral, PublicKeyToken=71e9bce111e9429c</Assembly>
+    <Class>Microsoft.Office.DocumentManagement.Internal.DocIdHandler</Class>
+    <Data/>
+    <Filter/>
+  </Receiver>
+  <Receiver>
+    <Name>Document ID Generator</Name>
+    <Synchronization>Synchronous</Synchronization>
+    <Type>10002</Type>
+    <SequenceNumber>1001</SequenceNumber>
+    <Url/>
+    <Assembly>Microsoft.Office.DocumentManagement, Version=15.0.0.0, Culture=neutral, PublicKeyToken=71e9bce111e9429c</Assembly>
+    <Class>Microsoft.Office.DocumentManagement.Internal.DocIdHandler</Class>
+    <Data/>
+    <Filter/>
+  </Receiver>
+  <Receiver>
+    <Name>Document ID Generator</Name>
+    <Synchronization>Synchronous</Synchronization>
+    <Type>10004</Type>
+    <SequenceNumber>1002</SequenceNumber>
+    <Url/>
+    <Assembly>Microsoft.Office.DocumentManagement, Version=15.0.0.0, Culture=neutral, PublicKeyToken=71e9bce111e9429c</Assembly>
+    <Class>Microsoft.Office.DocumentManagement.Internal.DocIdHandler</Class>
+    <Data/>
+    <Filter/>
+  </Receiver>
+  <Receiver>
+    <Name>Document ID Generator</Name>
+    <Synchronization>Synchronous</Synchronization>
+    <Type>10006</Type>
+    <SequenceNumber>1003</SequenceNumber>
+    <Url/>
+    <Assembly>Microsoft.Office.DocumentManagement, Version=15.0.0.0, Culture=neutral, PublicKeyToken=71e9bce111e9429c</Assembly>
+    <Class>Microsoft.Office.DocumentManagement.Internal.DocIdHandler</Class>
+    <Data/>
+    <Filter/>
+  </Receiver>
+</spe:Receivers>
+</file>
+
+<file path=customXml/item4.xml><?xml version="1.0" encoding="utf-8"?>
 <ct:contentTypeSchema xmlns:ct="http://schemas.microsoft.com/office/2006/metadata/contentType" xmlns:ma="http://schemas.microsoft.com/office/2006/metadata/properties/metaAttributes" ct:_="" ma:_="" ma:contentTypeName="Document" ma:contentTypeID="0x010100E25DA1609B7607469C1AC9B6F8A6FE9D" ma:contentTypeVersion="2" ma:contentTypeDescription="Create a new document." ma:contentTypeScope="" ma:versionID="4a9137d238132a7f3847ed896ce73801">
   <xsd:schema xmlns:xsd="http://www.w3.org/2001/XMLSchema" xmlns:xs="http://www.w3.org/2001/XMLSchema" xmlns:p="http://schemas.microsoft.com/office/2006/metadata/properties" xmlns:ns1="http://schemas.microsoft.com/sharepoint/v3" xmlns:ns2="696890a7-2738-473a-8580-15948eca3069" targetNamespace="http://schemas.microsoft.com/office/2006/metadata/properties" ma:root="true" ma:fieldsID="cc6804599cb381d96cddd0f9a4d92b86" ns1:_="" ns2:_="">
     <xsd:import namespace="http://schemas.microsoft.com/sharepoint/v3"/>
@@ -14190,65 +14589,7 @@
 </ct:contentTypeSchema>
 </file>
 
-<file path=customXml/item4.xml><?xml version="1.0" encoding="utf-8"?>
-<?mso-contentType ?>
-<spe:Receivers xmlns:spe="http://schemas.microsoft.com/sharepoint/events">
-  <Receiver>
-    <Name>Document ID Generator</Name>
-    <Synchronization>Synchronous</Synchronization>
-    <Type>10001</Type>
-    <SequenceNumber>1000</SequenceNumber>
-    <Url/>
-    <Assembly>Microsoft.Office.DocumentManagement, Version=15.0.0.0, Culture=neutral, PublicKeyToken=71e9bce111e9429c</Assembly>
-    <Class>Microsoft.Office.DocumentManagement.Internal.DocIdHandler</Class>
-    <Data/>
-    <Filter/>
-  </Receiver>
-  <Receiver>
-    <Name>Document ID Generator</Name>
-    <Synchronization>Synchronous</Synchronization>
-    <Type>10002</Type>
-    <SequenceNumber>1001</SequenceNumber>
-    <Url/>
-    <Assembly>Microsoft.Office.DocumentManagement, Version=15.0.0.0, Culture=neutral, PublicKeyToken=71e9bce111e9429c</Assembly>
-    <Class>Microsoft.Office.DocumentManagement.Internal.DocIdHandler</Class>
-    <Data/>
-    <Filter/>
-  </Receiver>
-  <Receiver>
-    <Name>Document ID Generator</Name>
-    <Synchronization>Synchronous</Synchronization>
-    <Type>10004</Type>
-    <SequenceNumber>1002</SequenceNumber>
-    <Url/>
-    <Assembly>Microsoft.Office.DocumentManagement, Version=15.0.0.0, Culture=neutral, PublicKeyToken=71e9bce111e9429c</Assembly>
-    <Class>Microsoft.Office.DocumentManagement.Internal.DocIdHandler</Class>
-    <Data/>
-    <Filter/>
-  </Receiver>
-  <Receiver>
-    <Name>Document ID Generator</Name>
-    <Synchronization>Synchronous</Synchronization>
-    <Type>10006</Type>
-    <SequenceNumber>1003</SequenceNumber>
-    <Url/>
-    <Assembly>Microsoft.Office.DocumentManagement, Version=15.0.0.0, Culture=neutral, PublicKeyToken=71e9bce111e9429c</Assembly>
-    <Class>Microsoft.Office.DocumentManagement.Internal.DocIdHandler</Class>
-    <Data/>
-    <Filter/>
-  </Receiver>
-</spe:Receivers>
-</file>
-
 <file path=customXml/itemProps1.xml><?xml version="1.0" encoding="utf-8"?>
-<ds:datastoreItem xmlns:ds="http://schemas.openxmlformats.org/officeDocument/2006/customXml" ds:itemID="{EBB62213-8F90-4EF1-A6A4-641F0452CB52}">
-  <ds:schemaRefs>
-    <ds:schemaRef ds:uri="http://schemas.microsoft.com/sharepoint/v3/contenttype/forms"/>
-  </ds:schemaRefs>
-</ds:datastoreItem>
-</file>
-
-<file path=customXml/itemProps2.xml><?xml version="1.0" encoding="utf-8"?>
 <ds:datastoreItem xmlns:ds="http://schemas.openxmlformats.org/officeDocument/2006/customXml" ds:itemID="{61631425-235C-4781-93DD-7928AF7173EF}">
   <ds:schemaRefs>
     <ds:schemaRef ds:uri="http://schemas.microsoft.com/office/2006/metadata/properties"/>
@@ -14265,7 +14606,23 @@
 </ds:datastoreItem>
 </file>
 
+<file path=customXml/itemProps2.xml><?xml version="1.0" encoding="utf-8"?>
+<ds:datastoreItem xmlns:ds="http://schemas.openxmlformats.org/officeDocument/2006/customXml" ds:itemID="{EBB62213-8F90-4EF1-A6A4-641F0452CB52}">
+  <ds:schemaRefs>
+    <ds:schemaRef ds:uri="http://schemas.microsoft.com/sharepoint/v3/contenttype/forms"/>
+  </ds:schemaRefs>
+</ds:datastoreItem>
+</file>
+
 <file path=customXml/itemProps3.xml><?xml version="1.0" encoding="utf-8"?>
+<ds:datastoreItem xmlns:ds="http://schemas.openxmlformats.org/officeDocument/2006/customXml" ds:itemID="{DFBE2CE3-A764-49E9-945D-1AE464F7016A}">
+  <ds:schemaRefs>
+    <ds:schemaRef ds:uri="http://schemas.microsoft.com/sharepoint/events"/>
+  </ds:schemaRefs>
+</ds:datastoreItem>
+</file>
+
+<file path=customXml/itemProps4.xml><?xml version="1.0" encoding="utf-8"?>
 <ds:datastoreItem xmlns:ds="http://schemas.openxmlformats.org/officeDocument/2006/customXml" ds:itemID="{9537DA68-33FD-40D7-963A-955D4E055832}">
   <ds:schemaRefs>
     <ds:schemaRef ds:uri="http://schemas.microsoft.com/office/2006/metadata/contentType"/>
@@ -14282,12 +14639,4 @@
     <ds:schemaRef ds:uri="http://schemas.microsoft.com/internal/obd"/>
   </ds:schemaRefs>
 </ds:datastoreItem>
-</file>
-
-<file path=customXml/itemProps4.xml><?xml version="1.0" encoding="utf-8"?>
-<ds:datastoreItem xmlns:ds="http://schemas.openxmlformats.org/officeDocument/2006/customXml" ds:itemID="{DFBE2CE3-A764-49E9-945D-1AE464F7016A}">
-  <ds:schemaRefs>
-    <ds:schemaRef ds:uri="http://schemas.microsoft.com/sharepoint/events"/>
-  </ds:schemaRefs>
-</ds:datastoreItem>
 </file>
</xml_diff>